<commit_message>
Add phần 3 các giai đoạn dự án
</commit_message>
<xml_diff>
--- a/Document/Slide_Project.pptx
+++ b/Document/Slide_Project.pptx
@@ -5,10 +5,10 @@
     <p:sldMasterId id="2147483696" r:id="rId2"/>
   </p:sldMasterIdLst>
   <p:notesMasterIdLst>
-    <p:notesMasterId r:id="rId12"/>
+    <p:notesMasterId r:id="rId15"/>
   </p:notesMasterIdLst>
   <p:handoutMasterIdLst>
-    <p:handoutMasterId r:id="rId13"/>
+    <p:handoutMasterId r:id="rId16"/>
   </p:handoutMasterIdLst>
   <p:sldIdLst>
     <p:sldId id="257" r:id="rId3"/>
@@ -19,7 +19,10 @@
     <p:sldId id="265" r:id="rId8"/>
     <p:sldId id="267" r:id="rId9"/>
     <p:sldId id="268" r:id="rId10"/>
-    <p:sldId id="269" r:id="rId11"/>
+    <p:sldId id="270" r:id="rId11"/>
+    <p:sldId id="271" r:id="rId12"/>
+    <p:sldId id="269" r:id="rId13"/>
+    <p:sldId id="272" r:id="rId14"/>
   </p:sldIdLst>
   <p:sldSz cx="12192000" cy="6858000"/>
   <p:notesSz cx="6858000" cy="9144000"/>
@@ -5176,6 +5179,691 @@
 </p:sld>
 </file>
 
+<file path=ppt/slides/slide10.xml><?xml version="1.0" encoding="utf-8"?>
+<p:sld xmlns:a="http://schemas.openxmlformats.org/drawingml/2006/main" xmlns:r="http://schemas.openxmlformats.org/officeDocument/2006/relationships" xmlns:p="http://schemas.openxmlformats.org/presentationml/2006/main">
+  <p:cSld>
+    <p:spTree>
+      <p:nvGrpSpPr>
+        <p:cNvPr id="1" name=""/>
+        <p:cNvGrpSpPr/>
+        <p:nvPr/>
+      </p:nvGrpSpPr>
+      <p:grpSpPr>
+        <a:xfrm>
+          <a:off x="0" y="0"/>
+          <a:ext cx="0" cy="0"/>
+          <a:chOff x="0" y="0"/>
+          <a:chExt cx="0" cy="0"/>
+        </a:xfrm>
+      </p:grpSpPr>
+      <p:sp>
+        <p:nvSpPr>
+          <p:cNvPr id="3" name="Title 2"/>
+          <p:cNvSpPr>
+            <a:spLocks noGrp="1"/>
+          </p:cNvSpPr>
+          <p:nvPr>
+            <p:ph type="title"/>
+          </p:nvPr>
+        </p:nvSpPr>
+        <p:spPr/>
+        <p:txBody>
+          <a:bodyPr/>
+          <a:lstStyle/>
+          <a:p>
+            <a:r>
+              <a:rPr lang="en-US" dirty="0" smtClean="0"/>
+              <a:t>3. CÁC ĐẦU MỤC CÔNG </a:t>
+            </a:r>
+            <a:r>
+              <a:rPr lang="en-US" dirty="0" err="1" smtClean="0"/>
+              <a:t>Việc</a:t>
+            </a:r>
+            <a:endParaRPr lang="en-US" dirty="0"/>
+          </a:p>
+        </p:txBody>
+      </p:sp>
+      <p:sp>
+        <p:nvSpPr>
+          <p:cNvPr id="2" name="Rectangle 1"/>
+          <p:cNvSpPr/>
+          <p:nvPr/>
+        </p:nvSpPr>
+        <p:spPr>
+          <a:xfrm>
+            <a:off x="1017431" y="1918952"/>
+            <a:ext cx="1803042" cy="4275786"/>
+          </a:xfrm>
+          <a:prstGeom prst="rect">
+            <a:avLst/>
+          </a:prstGeom>
+        </p:spPr>
+        <p:style>
+          <a:lnRef idx="1">
+            <a:schemeClr val="accent3"/>
+          </a:lnRef>
+          <a:fillRef idx="2">
+            <a:schemeClr val="accent3"/>
+          </a:fillRef>
+          <a:effectRef idx="1">
+            <a:schemeClr val="accent3"/>
+          </a:effectRef>
+          <a:fontRef idx="minor">
+            <a:schemeClr val="dk1"/>
+          </a:fontRef>
+        </p:style>
+        <p:txBody>
+          <a:bodyPr rtlCol="0" anchor="ctr"/>
+          <a:lstStyle/>
+          <a:p>
+            <a:pPr algn="ctr"/>
+            <a:r>
+              <a:rPr lang="en-US" dirty="0"/>
+              <a:t>Execution</a:t>
+            </a:r>
+          </a:p>
+          <a:p>
+            <a:pPr algn="ctr"/>
+            <a:endParaRPr lang="en-US" dirty="0"/>
+          </a:p>
+        </p:txBody>
+      </p:sp>
+      <p:sp>
+        <p:nvSpPr>
+          <p:cNvPr id="4" name="Oval 3"/>
+          <p:cNvSpPr/>
+          <p:nvPr/>
+        </p:nvSpPr>
+        <p:spPr>
+          <a:xfrm>
+            <a:off x="5215943" y="1587658"/>
+            <a:ext cx="4520485" cy="1052511"/>
+          </a:xfrm>
+          <a:prstGeom prst="ellipse">
+            <a:avLst/>
+          </a:prstGeom>
+        </p:spPr>
+        <p:style>
+          <a:lnRef idx="1">
+            <a:schemeClr val="accent3"/>
+          </a:lnRef>
+          <a:fillRef idx="2">
+            <a:schemeClr val="accent3"/>
+          </a:fillRef>
+          <a:effectRef idx="1">
+            <a:schemeClr val="accent3"/>
+          </a:effectRef>
+          <a:fontRef idx="minor">
+            <a:schemeClr val="dk1"/>
+          </a:fontRef>
+        </p:style>
+        <p:txBody>
+          <a:bodyPr rtlCol="0" anchor="ctr"/>
+          <a:lstStyle/>
+          <a:p>
+            <a:pPr algn="ctr"/>
+            <a:r>
+              <a:rPr lang="en-US" dirty="0" smtClean="0"/>
+              <a:t>User requirement specification document</a:t>
+            </a:r>
+            <a:endParaRPr lang="en-US" dirty="0"/>
+          </a:p>
+        </p:txBody>
+      </p:sp>
+      <p:sp>
+        <p:nvSpPr>
+          <p:cNvPr id="6" name="Oval 5"/>
+          <p:cNvSpPr/>
+          <p:nvPr/>
+        </p:nvSpPr>
+        <p:spPr>
+          <a:xfrm>
+            <a:off x="5215942" y="2810191"/>
+            <a:ext cx="4520485" cy="1052511"/>
+          </a:xfrm>
+          <a:prstGeom prst="ellipse">
+            <a:avLst/>
+          </a:prstGeom>
+        </p:spPr>
+        <p:style>
+          <a:lnRef idx="1">
+            <a:schemeClr val="accent3"/>
+          </a:lnRef>
+          <a:fillRef idx="2">
+            <a:schemeClr val="accent3"/>
+          </a:fillRef>
+          <a:effectRef idx="1">
+            <a:schemeClr val="accent3"/>
+          </a:effectRef>
+          <a:fontRef idx="minor">
+            <a:schemeClr val="dk1"/>
+          </a:fontRef>
+        </p:style>
+        <p:txBody>
+          <a:bodyPr rtlCol="0" anchor="ctr"/>
+          <a:lstStyle/>
+          <a:p>
+            <a:pPr algn="ctr"/>
+            <a:r>
+              <a:rPr lang="en-US" dirty="0" smtClean="0"/>
+              <a:t>Design: GUI, Database</a:t>
+            </a:r>
+            <a:endParaRPr lang="en-US" dirty="0"/>
+          </a:p>
+        </p:txBody>
+      </p:sp>
+      <p:sp>
+        <p:nvSpPr>
+          <p:cNvPr id="7" name="Oval 6"/>
+          <p:cNvSpPr/>
+          <p:nvPr/>
+        </p:nvSpPr>
+        <p:spPr>
+          <a:xfrm>
+            <a:off x="5215941" y="4126573"/>
+            <a:ext cx="4520485" cy="1052511"/>
+          </a:xfrm>
+          <a:prstGeom prst="ellipse">
+            <a:avLst/>
+          </a:prstGeom>
+        </p:spPr>
+        <p:style>
+          <a:lnRef idx="1">
+            <a:schemeClr val="accent3"/>
+          </a:lnRef>
+          <a:fillRef idx="2">
+            <a:schemeClr val="accent3"/>
+          </a:fillRef>
+          <a:effectRef idx="1">
+            <a:schemeClr val="accent3"/>
+          </a:effectRef>
+          <a:fontRef idx="minor">
+            <a:schemeClr val="dk1"/>
+          </a:fontRef>
+        </p:style>
+        <p:txBody>
+          <a:bodyPr rtlCol="0" anchor="ctr"/>
+          <a:lstStyle/>
+          <a:p>
+            <a:pPr algn="ctr"/>
+            <a:r>
+              <a:rPr lang="en-US" dirty="0" smtClean="0"/>
+              <a:t>Coding: Business </a:t>
+            </a:r>
+          </a:p>
+        </p:txBody>
+      </p:sp>
+      <p:sp>
+        <p:nvSpPr>
+          <p:cNvPr id="8" name="Oval 7"/>
+          <p:cNvSpPr/>
+          <p:nvPr/>
+        </p:nvSpPr>
+        <p:spPr>
+          <a:xfrm>
+            <a:off x="5215941" y="5442955"/>
+            <a:ext cx="4520485" cy="1052511"/>
+          </a:xfrm>
+          <a:prstGeom prst="ellipse">
+            <a:avLst/>
+          </a:prstGeom>
+        </p:spPr>
+        <p:style>
+          <a:lnRef idx="1">
+            <a:schemeClr val="accent3"/>
+          </a:lnRef>
+          <a:fillRef idx="2">
+            <a:schemeClr val="accent3"/>
+          </a:fillRef>
+          <a:effectRef idx="1">
+            <a:schemeClr val="accent3"/>
+          </a:effectRef>
+          <a:fontRef idx="minor">
+            <a:schemeClr val="dk1"/>
+          </a:fontRef>
+        </p:style>
+        <p:txBody>
+          <a:bodyPr rtlCol="0" anchor="ctr"/>
+          <a:lstStyle/>
+          <a:p>
+            <a:pPr algn="ctr"/>
+            <a:r>
+              <a:rPr lang="en-US" dirty="0" smtClean="0"/>
+              <a:t>Testing</a:t>
+            </a:r>
+            <a:endParaRPr lang="en-US" dirty="0"/>
+          </a:p>
+        </p:txBody>
+      </p:sp>
+    </p:spTree>
+    <p:extLst>
+      <p:ext uri="{BB962C8B-B14F-4D97-AF65-F5344CB8AC3E}">
+        <p14:creationId xmlns:p14="http://schemas.microsoft.com/office/powerpoint/2010/main" val="3717186303"/>
+      </p:ext>
+    </p:extLst>
+  </p:cSld>
+  <p:clrMapOvr>
+    <a:masterClrMapping/>
+  </p:clrMapOvr>
+  <mc:AlternateContent xmlns:mc="http://schemas.openxmlformats.org/markup-compatibility/2006" xmlns:p14="http://schemas.microsoft.com/office/powerpoint/2010/main">
+    <mc:Choice Requires="p14">
+      <p:transition spd="med" p14:dur="700">
+        <p:fade/>
+      </p:transition>
+    </mc:Choice>
+    <mc:Fallback xmlns="">
+      <p:transition spd="med">
+        <p:fade/>
+      </p:transition>
+    </mc:Fallback>
+  </mc:AlternateContent>
+  <p:timing>
+    <p:tnLst>
+      <p:par>
+        <p:cTn id="1" dur="indefinite" restart="never" nodeType="tmRoot"/>
+      </p:par>
+    </p:tnLst>
+  </p:timing>
+</p:sld>
+</file>
+
+<file path=ppt/slides/slide11.xml><?xml version="1.0" encoding="utf-8"?>
+<p:sld xmlns:a="http://schemas.openxmlformats.org/drawingml/2006/main" xmlns:r="http://schemas.openxmlformats.org/officeDocument/2006/relationships" xmlns:p="http://schemas.openxmlformats.org/presentationml/2006/main">
+  <p:cSld>
+    <p:spTree>
+      <p:nvGrpSpPr>
+        <p:cNvPr id="1" name=""/>
+        <p:cNvGrpSpPr/>
+        <p:nvPr/>
+      </p:nvGrpSpPr>
+      <p:grpSpPr>
+        <a:xfrm>
+          <a:off x="0" y="0"/>
+          <a:ext cx="0" cy="0"/>
+          <a:chOff x="0" y="0"/>
+          <a:chExt cx="0" cy="0"/>
+        </a:xfrm>
+      </p:grpSpPr>
+      <p:sp>
+        <p:nvSpPr>
+          <p:cNvPr id="3" name="Title 2"/>
+          <p:cNvSpPr>
+            <a:spLocks noGrp="1"/>
+          </p:cNvSpPr>
+          <p:nvPr>
+            <p:ph type="title"/>
+          </p:nvPr>
+        </p:nvSpPr>
+        <p:spPr/>
+        <p:txBody>
+          <a:bodyPr/>
+          <a:lstStyle/>
+          <a:p>
+            <a:r>
+              <a:rPr lang="en-US" dirty="0"/>
+              <a:t>3. CÁC ĐẦU MỤC CÔNG </a:t>
+            </a:r>
+            <a:r>
+              <a:rPr lang="en-US" dirty="0" err="1"/>
+              <a:t>Việc</a:t>
+            </a:r>
+            <a:endParaRPr lang="en-US" dirty="0"/>
+          </a:p>
+        </p:txBody>
+      </p:sp>
+      <p:sp>
+        <p:nvSpPr>
+          <p:cNvPr id="4" name="Rectangle 3"/>
+          <p:cNvSpPr/>
+          <p:nvPr/>
+        </p:nvSpPr>
+        <p:spPr>
+          <a:xfrm>
+            <a:off x="1223493" y="2318197"/>
+            <a:ext cx="1764406" cy="3657600"/>
+          </a:xfrm>
+          <a:prstGeom prst="rect">
+            <a:avLst/>
+          </a:prstGeom>
+        </p:spPr>
+        <p:style>
+          <a:lnRef idx="1">
+            <a:schemeClr val="accent3"/>
+          </a:lnRef>
+          <a:fillRef idx="2">
+            <a:schemeClr val="accent3"/>
+          </a:fillRef>
+          <a:effectRef idx="1">
+            <a:schemeClr val="accent3"/>
+          </a:effectRef>
+          <a:fontRef idx="minor">
+            <a:schemeClr val="dk1"/>
+          </a:fontRef>
+        </p:style>
+        <p:txBody>
+          <a:bodyPr rtlCol="0" anchor="ctr"/>
+          <a:lstStyle/>
+          <a:p>
+            <a:pPr algn="ctr"/>
+            <a:r>
+              <a:rPr lang="en-US" dirty="0"/>
+              <a:t>Control</a:t>
+            </a:r>
+          </a:p>
+          <a:p>
+            <a:pPr algn="ctr"/>
+            <a:endParaRPr lang="en-US" dirty="0"/>
+          </a:p>
+        </p:txBody>
+      </p:sp>
+      <p:sp>
+        <p:nvSpPr>
+          <p:cNvPr id="5" name="Oval 4"/>
+          <p:cNvSpPr/>
+          <p:nvPr/>
+        </p:nvSpPr>
+        <p:spPr>
+          <a:xfrm>
+            <a:off x="4018207" y="2318197"/>
+            <a:ext cx="5743978" cy="1068947"/>
+          </a:xfrm>
+          <a:prstGeom prst="ellipse">
+            <a:avLst/>
+          </a:prstGeom>
+        </p:spPr>
+        <p:style>
+          <a:lnRef idx="1">
+            <a:schemeClr val="accent3"/>
+          </a:lnRef>
+          <a:fillRef idx="2">
+            <a:schemeClr val="accent3"/>
+          </a:fillRef>
+          <a:effectRef idx="1">
+            <a:schemeClr val="accent3"/>
+          </a:effectRef>
+          <a:fontRef idx="minor">
+            <a:schemeClr val="dk1"/>
+          </a:fontRef>
+        </p:style>
+        <p:txBody>
+          <a:bodyPr rtlCol="0" anchor="ctr"/>
+          <a:lstStyle/>
+          <a:p>
+            <a:pPr algn="ctr"/>
+            <a:r>
+              <a:rPr lang="en-US" dirty="0" err="1" smtClean="0"/>
+              <a:t>Kiểm</a:t>
+            </a:r>
+            <a:r>
+              <a:rPr lang="en-US" dirty="0" smtClean="0"/>
+              <a:t> </a:t>
+            </a:r>
+            <a:r>
+              <a:rPr lang="en-US" dirty="0" err="1" smtClean="0"/>
+              <a:t>soát</a:t>
+            </a:r>
+            <a:r>
+              <a:rPr lang="en-US" dirty="0" smtClean="0"/>
+              <a:t> </a:t>
+            </a:r>
+            <a:r>
+              <a:rPr lang="en-US" dirty="0" err="1" smtClean="0"/>
+              <a:t>tiến</a:t>
+            </a:r>
+            <a:r>
+              <a:rPr lang="en-US" dirty="0" smtClean="0"/>
+              <a:t> </a:t>
+            </a:r>
+            <a:r>
+              <a:rPr lang="en-US" dirty="0" err="1" smtClean="0"/>
+              <a:t>độ</a:t>
+            </a:r>
+            <a:r>
+              <a:rPr lang="en-US" dirty="0" smtClean="0"/>
+              <a:t> </a:t>
+            </a:r>
+            <a:r>
+              <a:rPr lang="en-US" dirty="0" err="1" smtClean="0"/>
+              <a:t>của</a:t>
+            </a:r>
+            <a:r>
+              <a:rPr lang="en-US" dirty="0" smtClean="0"/>
+              <a:t> </a:t>
+            </a:r>
+            <a:r>
+              <a:rPr lang="en-US" dirty="0" err="1" smtClean="0"/>
+              <a:t>dự</a:t>
+            </a:r>
+            <a:r>
+              <a:rPr lang="en-US" dirty="0" smtClean="0"/>
+              <a:t> </a:t>
+            </a:r>
+            <a:r>
+              <a:rPr lang="en-US" dirty="0" err="1" smtClean="0"/>
+              <a:t>án</a:t>
+            </a:r>
+            <a:endParaRPr lang="en-US" dirty="0"/>
+          </a:p>
+        </p:txBody>
+      </p:sp>
+      <p:sp>
+        <p:nvSpPr>
+          <p:cNvPr id="8" name="Oval 7"/>
+          <p:cNvSpPr/>
+          <p:nvPr/>
+        </p:nvSpPr>
+        <p:spPr>
+          <a:xfrm>
+            <a:off x="4018207" y="4642833"/>
+            <a:ext cx="5743978" cy="1068947"/>
+          </a:xfrm>
+          <a:prstGeom prst="ellipse">
+            <a:avLst/>
+          </a:prstGeom>
+        </p:spPr>
+        <p:style>
+          <a:lnRef idx="1">
+            <a:schemeClr val="accent3"/>
+          </a:lnRef>
+          <a:fillRef idx="2">
+            <a:schemeClr val="accent3"/>
+          </a:fillRef>
+          <a:effectRef idx="1">
+            <a:schemeClr val="accent3"/>
+          </a:effectRef>
+          <a:fontRef idx="minor">
+            <a:schemeClr val="dk1"/>
+          </a:fontRef>
+        </p:style>
+        <p:txBody>
+          <a:bodyPr rtlCol="0" anchor="ctr"/>
+          <a:lstStyle/>
+          <a:p>
+            <a:pPr algn="ctr"/>
+            <a:r>
+              <a:rPr lang="en-US" dirty="0" err="1" smtClean="0"/>
+              <a:t>Kiểm</a:t>
+            </a:r>
+            <a:r>
+              <a:rPr lang="en-US" dirty="0" smtClean="0"/>
+              <a:t> </a:t>
+            </a:r>
+            <a:r>
+              <a:rPr lang="en-US" dirty="0" err="1" smtClean="0"/>
+              <a:t>soát</a:t>
+            </a:r>
+            <a:r>
+              <a:rPr lang="en-US" dirty="0" smtClean="0"/>
+              <a:t> </a:t>
+            </a:r>
+            <a:r>
+              <a:rPr lang="en-US" dirty="0" err="1" smtClean="0"/>
+              <a:t>độ</a:t>
+            </a:r>
+            <a:r>
+              <a:rPr lang="en-US" dirty="0" smtClean="0"/>
+              <a:t> risk </a:t>
+            </a:r>
+            <a:r>
+              <a:rPr lang="en-US" dirty="0" err="1" smtClean="0"/>
+              <a:t>của</a:t>
+            </a:r>
+            <a:r>
+              <a:rPr lang="en-US" dirty="0" smtClean="0"/>
+              <a:t> </a:t>
+            </a:r>
+            <a:r>
+              <a:rPr lang="en-US" dirty="0" err="1" smtClean="0"/>
+              <a:t>dự</a:t>
+            </a:r>
+            <a:r>
+              <a:rPr lang="en-US" dirty="0" smtClean="0"/>
+              <a:t> </a:t>
+            </a:r>
+            <a:r>
+              <a:rPr lang="en-US" dirty="0" err="1" smtClean="0"/>
+              <a:t>án</a:t>
+            </a:r>
+            <a:endParaRPr lang="en-US" dirty="0"/>
+          </a:p>
+        </p:txBody>
+      </p:sp>
+    </p:spTree>
+    <p:extLst>
+      <p:ext uri="{BB962C8B-B14F-4D97-AF65-F5344CB8AC3E}">
+        <p14:creationId xmlns:p14="http://schemas.microsoft.com/office/powerpoint/2010/main" val="1365680749"/>
+      </p:ext>
+    </p:extLst>
+  </p:cSld>
+  <p:clrMapOvr>
+    <a:masterClrMapping/>
+  </p:clrMapOvr>
+  <mc:AlternateContent xmlns:mc="http://schemas.openxmlformats.org/markup-compatibility/2006" xmlns:p14="http://schemas.microsoft.com/office/powerpoint/2010/main">
+    <mc:Choice Requires="p14">
+      <p:transition spd="med" p14:dur="700">
+        <p:fade/>
+      </p:transition>
+    </mc:Choice>
+    <mc:Fallback xmlns="">
+      <p:transition spd="med">
+        <p:fade/>
+      </p:transition>
+    </mc:Fallback>
+  </mc:AlternateContent>
+</p:sld>
+</file>
+
+<file path=ppt/slides/slide12.xml><?xml version="1.0" encoding="utf-8"?>
+<p:sld xmlns:a="http://schemas.openxmlformats.org/drawingml/2006/main" xmlns:r="http://schemas.openxmlformats.org/officeDocument/2006/relationships" xmlns:p="http://schemas.openxmlformats.org/presentationml/2006/main">
+  <p:cSld>
+    <p:spTree>
+      <p:nvGrpSpPr>
+        <p:cNvPr id="1" name=""/>
+        <p:cNvGrpSpPr/>
+        <p:nvPr/>
+      </p:nvGrpSpPr>
+      <p:grpSpPr>
+        <a:xfrm>
+          <a:off x="0" y="0"/>
+          <a:ext cx="0" cy="0"/>
+          <a:chOff x="0" y="0"/>
+          <a:chExt cx="0" cy="0"/>
+        </a:xfrm>
+      </p:grpSpPr>
+      <p:sp>
+        <p:nvSpPr>
+          <p:cNvPr id="3" name="Title 2"/>
+          <p:cNvSpPr>
+            <a:spLocks noGrp="1"/>
+          </p:cNvSpPr>
+          <p:nvPr>
+            <p:ph type="title"/>
+          </p:nvPr>
+        </p:nvSpPr>
+        <p:spPr/>
+        <p:txBody>
+          <a:bodyPr/>
+          <a:lstStyle/>
+          <a:p>
+            <a:r>
+              <a:rPr lang="en-US" dirty="0"/>
+              <a:t>3. CÁC ĐẦU MỤC CÔNG </a:t>
+            </a:r>
+            <a:r>
+              <a:rPr lang="en-US" dirty="0" err="1"/>
+              <a:t>Việc</a:t>
+            </a:r>
+            <a:endParaRPr lang="en-US" dirty="0"/>
+          </a:p>
+        </p:txBody>
+      </p:sp>
+      <p:sp>
+        <p:nvSpPr>
+          <p:cNvPr id="4" name="Rectangle 3"/>
+          <p:cNvSpPr/>
+          <p:nvPr/>
+        </p:nvSpPr>
+        <p:spPr>
+          <a:xfrm>
+            <a:off x="2137893" y="2962141"/>
+            <a:ext cx="8332631" cy="1416676"/>
+          </a:xfrm>
+          <a:prstGeom prst="rect">
+            <a:avLst/>
+          </a:prstGeom>
+        </p:spPr>
+        <p:style>
+          <a:lnRef idx="1">
+            <a:schemeClr val="accent3"/>
+          </a:lnRef>
+          <a:fillRef idx="2">
+            <a:schemeClr val="accent3"/>
+          </a:fillRef>
+          <a:effectRef idx="1">
+            <a:schemeClr val="accent3"/>
+          </a:effectRef>
+          <a:fontRef idx="minor">
+            <a:schemeClr val="dk1"/>
+          </a:fontRef>
+        </p:style>
+        <p:txBody>
+          <a:bodyPr rtlCol="0" anchor="ctr"/>
+          <a:lstStyle/>
+          <a:p>
+            <a:pPr algn="ctr"/>
+            <a:r>
+              <a:rPr lang="en-US" dirty="0" smtClean="0"/>
+              <a:t>Close out</a:t>
+            </a:r>
+            <a:endParaRPr lang="en-US" dirty="0"/>
+          </a:p>
+        </p:txBody>
+      </p:sp>
+    </p:spTree>
+    <p:extLst>
+      <p:ext uri="{BB962C8B-B14F-4D97-AF65-F5344CB8AC3E}">
+        <p14:creationId xmlns:p14="http://schemas.microsoft.com/office/powerpoint/2010/main" val="938373921"/>
+      </p:ext>
+    </p:extLst>
+  </p:cSld>
+  <p:clrMapOvr>
+    <a:masterClrMapping/>
+  </p:clrMapOvr>
+  <mc:AlternateContent xmlns:mc="http://schemas.openxmlformats.org/markup-compatibility/2006" xmlns:p14="http://schemas.microsoft.com/office/powerpoint/2010/main">
+    <mc:Choice Requires="p14">
+      <p:transition spd="med" p14:dur="700">
+        <p:fade/>
+      </p:transition>
+    </mc:Choice>
+    <mc:Fallback xmlns="">
+      <p:transition spd="med">
+        <p:fade/>
+      </p:transition>
+    </mc:Fallback>
+  </mc:AlternateContent>
+</p:sld>
+</file>
+
 <file path=ppt/slides/slide2.xml><?xml version="1.0" encoding="utf-8"?>
 <p:sld xmlns:a="http://schemas.openxmlformats.org/drawingml/2006/main" xmlns:r="http://schemas.openxmlformats.org/officeDocument/2006/relationships" xmlns:p="http://schemas.openxmlformats.org/presentationml/2006/main">
   <p:cSld>
@@ -5661,12 +6349,12 @@
       </p:grpSpPr>
       <p:sp>
         <p:nvSpPr>
-          <p:cNvPr id="2" name="Content Placeholder 1"/>
-          <p:cNvSpPr>
-            <a:spLocks noGrp="1"/>
-          </p:cNvSpPr>
-          <p:nvPr>
-            <p:ph idx="1"/>
+          <p:cNvPr id="3" name="Title 2"/>
+          <p:cNvSpPr>
+            <a:spLocks noGrp="1"/>
+          </p:cNvSpPr>
+          <p:nvPr>
+            <p:ph type="title"/>
           </p:nvPr>
         </p:nvSpPr>
         <p:spPr/>
@@ -5674,30 +6362,211 @@
           <a:bodyPr/>
           <a:lstStyle/>
           <a:p>
-            <a:endParaRPr lang="en-US"/>
-          </a:p>
-        </p:txBody>
-      </p:sp>
-      <p:sp>
-        <p:nvSpPr>
-          <p:cNvPr id="3" name="Title 2"/>
-          <p:cNvSpPr>
-            <a:spLocks noGrp="1"/>
-          </p:cNvSpPr>
-          <p:nvPr>
-            <p:ph type="title"/>
-          </p:nvPr>
-        </p:nvSpPr>
-        <p:spPr/>
-        <p:txBody>
-          <a:bodyPr/>
-          <a:lstStyle/>
-          <a:p>
             <a:r>
               <a:rPr lang="en-US" dirty="0" smtClean="0"/>
               <a:t>2.TÍNH KHẢ THI CỦA DỰ ÁN</a:t>
             </a:r>
             <a:endParaRPr lang="en-US" dirty="0"/>
+          </a:p>
+        </p:txBody>
+      </p:sp>
+      <p:sp>
+        <p:nvSpPr>
+          <p:cNvPr id="4" name="Oval 3"/>
+          <p:cNvSpPr/>
+          <p:nvPr/>
+        </p:nvSpPr>
+        <p:spPr>
+          <a:xfrm>
+            <a:off x="1153731" y="2060620"/>
+            <a:ext cx="3701604" cy="1532586"/>
+          </a:xfrm>
+          <a:prstGeom prst="ellipse">
+            <a:avLst/>
+          </a:prstGeom>
+        </p:spPr>
+        <p:style>
+          <a:lnRef idx="1">
+            <a:schemeClr val="accent5"/>
+          </a:lnRef>
+          <a:fillRef idx="2">
+            <a:schemeClr val="accent5"/>
+          </a:fillRef>
+          <a:effectRef idx="1">
+            <a:schemeClr val="accent5"/>
+          </a:effectRef>
+          <a:fontRef idx="minor">
+            <a:schemeClr val="dk1"/>
+          </a:fontRef>
+        </p:style>
+        <p:txBody>
+          <a:bodyPr rtlCol="0" anchor="ctr"/>
+          <a:lstStyle/>
+          <a:p>
+            <a:pPr algn="ctr"/>
+            <a:r>
+              <a:rPr lang="en-US" dirty="0" err="1" smtClean="0"/>
+              <a:t>Việc</a:t>
+            </a:r>
+            <a:r>
+              <a:rPr lang="en-US" dirty="0" smtClean="0"/>
+              <a:t> </a:t>
+            </a:r>
+            <a:r>
+              <a:rPr lang="en-US" dirty="0" err="1" smtClean="0"/>
+              <a:t>mua</a:t>
+            </a:r>
+            <a:r>
+              <a:rPr lang="en-US" dirty="0" smtClean="0"/>
+              <a:t> </a:t>
+            </a:r>
+            <a:r>
+              <a:rPr lang="en-US" dirty="0" err="1" smtClean="0"/>
+              <a:t>bán</a:t>
+            </a:r>
+            <a:r>
+              <a:rPr lang="en-US" dirty="0" smtClean="0"/>
+              <a:t> </a:t>
+            </a:r>
+            <a:r>
+              <a:rPr lang="en-US" dirty="0" err="1" smtClean="0"/>
+              <a:t>hàng</a:t>
+            </a:r>
+            <a:r>
+              <a:rPr lang="en-US" dirty="0" smtClean="0"/>
+              <a:t> online </a:t>
+            </a:r>
+            <a:r>
+              <a:rPr lang="en-US" dirty="0" err="1" smtClean="0"/>
+              <a:t>đang</a:t>
+            </a:r>
+            <a:r>
+              <a:rPr lang="en-US" dirty="0" smtClean="0"/>
+              <a:t> </a:t>
+            </a:r>
+            <a:r>
+              <a:rPr lang="en-US" dirty="0" err="1" smtClean="0"/>
+              <a:t>dần</a:t>
+            </a:r>
+            <a:r>
+              <a:rPr lang="en-US" dirty="0" smtClean="0"/>
+              <a:t> </a:t>
+            </a:r>
+            <a:r>
+              <a:rPr lang="en-US" dirty="0" err="1" smtClean="0"/>
+              <a:t>trở</a:t>
+            </a:r>
+            <a:r>
+              <a:rPr lang="en-US" dirty="0" smtClean="0"/>
+              <a:t> </a:t>
+            </a:r>
+            <a:r>
+              <a:rPr lang="en-US" dirty="0" err="1" smtClean="0"/>
+              <a:t>nên</a:t>
+            </a:r>
+            <a:r>
+              <a:rPr lang="en-US" dirty="0" smtClean="0"/>
+              <a:t> </a:t>
+            </a:r>
+            <a:r>
+              <a:rPr lang="en-US" dirty="0" err="1" smtClean="0"/>
+              <a:t>phổ</a:t>
+            </a:r>
+            <a:r>
+              <a:rPr lang="en-US" dirty="0" smtClean="0"/>
+              <a:t> </a:t>
+            </a:r>
+            <a:r>
+              <a:rPr lang="en-US" dirty="0" err="1" smtClean="0"/>
+              <a:t>biến</a:t>
+            </a:r>
+            <a:r>
+              <a:rPr lang="en-US" dirty="0" smtClean="0"/>
+              <a:t>, </a:t>
+            </a:r>
+            <a:r>
+              <a:rPr lang="en-US" dirty="0" err="1" smtClean="0"/>
+              <a:t>và</a:t>
+            </a:r>
+            <a:r>
+              <a:rPr lang="en-US" dirty="0" smtClean="0"/>
+              <a:t> </a:t>
+            </a:r>
+            <a:r>
+              <a:rPr lang="en-US" dirty="0" err="1" smtClean="0"/>
+              <a:t>tất</a:t>
+            </a:r>
+            <a:r>
+              <a:rPr lang="en-US" dirty="0" smtClean="0"/>
+              <a:t> </a:t>
+            </a:r>
+            <a:r>
+              <a:rPr lang="en-US" dirty="0" err="1" smtClean="0"/>
+              <a:t>yêu</a:t>
+            </a:r>
+            <a:r>
+              <a:rPr lang="en-US" dirty="0" smtClean="0"/>
+              <a:t> </a:t>
+            </a:r>
+            <a:r>
+              <a:rPr lang="en-US" dirty="0" err="1" smtClean="0"/>
+              <a:t>trong</a:t>
+            </a:r>
+            <a:r>
+              <a:rPr lang="en-US" dirty="0" smtClean="0"/>
+              <a:t> </a:t>
+            </a:r>
+            <a:r>
+              <a:rPr lang="en-US" dirty="0" err="1" smtClean="0"/>
+              <a:t>đời</a:t>
+            </a:r>
+            <a:r>
+              <a:rPr lang="en-US" dirty="0" smtClean="0"/>
+              <a:t> </a:t>
+            </a:r>
+            <a:r>
+              <a:rPr lang="en-US" dirty="0" err="1" smtClean="0"/>
+              <a:t>sống</a:t>
+            </a:r>
+            <a:endParaRPr lang="en-US" dirty="0"/>
+          </a:p>
+        </p:txBody>
+      </p:sp>
+      <p:sp>
+        <p:nvSpPr>
+          <p:cNvPr id="5" name="Oval 4"/>
+          <p:cNvSpPr/>
+          <p:nvPr/>
+        </p:nvSpPr>
+        <p:spPr>
+          <a:xfrm>
+            <a:off x="6851560" y="2060620"/>
+            <a:ext cx="3103808" cy="1532586"/>
+          </a:xfrm>
+          <a:prstGeom prst="ellipse">
+            <a:avLst/>
+          </a:prstGeom>
+        </p:spPr>
+        <p:style>
+          <a:lnRef idx="1">
+            <a:schemeClr val="accent5"/>
+          </a:lnRef>
+          <a:fillRef idx="2">
+            <a:schemeClr val="accent5"/>
+          </a:fillRef>
+          <a:effectRef idx="1">
+            <a:schemeClr val="accent5"/>
+          </a:effectRef>
+          <a:fontRef idx="minor">
+            <a:schemeClr val="dk1"/>
+          </a:fontRef>
+        </p:style>
+        <p:txBody>
+          <a:bodyPr rtlCol="0" anchor="ctr"/>
+          <a:lstStyle/>
+          <a:p>
+            <a:pPr algn="ctr"/>
+            <a:endParaRPr lang="en-US"/>
           </a:p>
         </p:txBody>
       </p:sp>
@@ -5723,6 +6592,13 @@
       </p:transition>
     </mc:Fallback>
   </mc:AlternateContent>
+  <p:timing>
+    <p:tnLst>
+      <p:par>
+        <p:cTn id="1" dur="indefinite" restart="never" nodeType="tmRoot"/>
+      </p:par>
+    </p:tnLst>
+  </p:timing>
 </p:sld>
 </file>
 
@@ -5745,12 +6621,12 @@
       </p:grpSpPr>
       <p:sp>
         <p:nvSpPr>
-          <p:cNvPr id="2" name="Content Placeholder 1"/>
-          <p:cNvSpPr>
-            <a:spLocks noGrp="1"/>
-          </p:cNvSpPr>
-          <p:nvPr>
-            <p:ph idx="1"/>
+          <p:cNvPr id="3" name="Title 2"/>
+          <p:cNvSpPr>
+            <a:spLocks noGrp="1"/>
+          </p:cNvSpPr>
+          <p:nvPr>
+            <p:ph type="title"/>
           </p:nvPr>
         </p:nvSpPr>
         <p:spPr/>
@@ -5758,28 +6634,286 @@
           <a:bodyPr/>
           <a:lstStyle/>
           <a:p>
-            <a:endParaRPr lang="en-US"/>
-          </a:p>
-        </p:txBody>
-      </p:sp>
-      <p:sp>
-        <p:nvSpPr>
-          <p:cNvPr id="3" name="Title 2"/>
-          <p:cNvSpPr>
-            <a:spLocks noGrp="1"/>
-          </p:cNvSpPr>
-          <p:nvPr>
-            <p:ph type="title"/>
-          </p:nvPr>
-        </p:nvSpPr>
-        <p:spPr/>
-        <p:txBody>
-          <a:bodyPr/>
+            <a:r>
+              <a:rPr lang="en-US" dirty="0" smtClean="0">
+                <a:latin typeface="Times New Roman" panose="02020603050405020304" pitchFamily="18" charset="0"/>
+                <a:cs typeface="Times New Roman" panose="02020603050405020304" pitchFamily="18" charset="0"/>
+              </a:rPr>
+              <a:t>3. CÁC ĐẦU MỤC CÔNG VIỆC</a:t>
+            </a:r>
+            <a:endParaRPr lang="en-US" dirty="0">
+              <a:latin typeface="Times New Roman" panose="02020603050405020304" pitchFamily="18" charset="0"/>
+              <a:cs typeface="Times New Roman" panose="02020603050405020304" pitchFamily="18" charset="0"/>
+            </a:endParaRPr>
+          </a:p>
+        </p:txBody>
+      </p:sp>
+      <p:sp>
+        <p:nvSpPr>
+          <p:cNvPr id="5" name="Rectangle 4"/>
+          <p:cNvSpPr/>
+          <p:nvPr/>
+        </p:nvSpPr>
+        <p:spPr>
+          <a:xfrm>
+            <a:off x="1558344" y="2021983"/>
+            <a:ext cx="1983346" cy="4456090"/>
+          </a:xfrm>
+          <a:prstGeom prst="rect">
+            <a:avLst/>
+          </a:prstGeom>
+        </p:spPr>
+        <p:style>
+          <a:lnRef idx="1">
+            <a:schemeClr val="accent3"/>
+          </a:lnRef>
+          <a:fillRef idx="2">
+            <a:schemeClr val="accent3"/>
+          </a:fillRef>
+          <a:effectRef idx="1">
+            <a:schemeClr val="accent3"/>
+          </a:effectRef>
+          <a:fontRef idx="minor">
+            <a:schemeClr val="dk1"/>
+          </a:fontRef>
+        </p:style>
+        <p:txBody>
+          <a:bodyPr rtlCol="0" anchor="ctr"/>
           <a:lstStyle/>
           <a:p>
+            <a:pPr algn="ctr"/>
+            <a:r>
+              <a:rPr lang="en-US" dirty="0"/>
+              <a:t>Initiation</a:t>
+            </a:r>
+          </a:p>
+          <a:p>
+            <a:pPr algn="ctr"/>
+            <a:endParaRPr lang="en-US" dirty="0"/>
+          </a:p>
+        </p:txBody>
+      </p:sp>
+      <p:sp>
+        <p:nvSpPr>
+          <p:cNvPr id="6" name="Oval 5"/>
+          <p:cNvSpPr/>
+          <p:nvPr/>
+        </p:nvSpPr>
+        <p:spPr>
+          <a:xfrm>
+            <a:off x="6276303" y="1690688"/>
+            <a:ext cx="4632101" cy="1159099"/>
+          </a:xfrm>
+          <a:prstGeom prst="ellipse">
+            <a:avLst/>
+          </a:prstGeom>
+        </p:spPr>
+        <p:style>
+          <a:lnRef idx="1">
+            <a:schemeClr val="accent3"/>
+          </a:lnRef>
+          <a:fillRef idx="2">
+            <a:schemeClr val="accent3"/>
+          </a:fillRef>
+          <a:effectRef idx="1">
+            <a:schemeClr val="accent3"/>
+          </a:effectRef>
+          <a:fontRef idx="minor">
+            <a:schemeClr val="dk1"/>
+          </a:fontRef>
+        </p:style>
+        <p:txBody>
+          <a:bodyPr rtlCol="0" anchor="ctr"/>
+          <a:lstStyle/>
+          <a:p>
+            <a:pPr algn="ctr"/>
+            <a:r>
+              <a:rPr lang="en-US" dirty="0" err="1" smtClean="0"/>
+              <a:t>Xác</a:t>
+            </a:r>
             <a:r>
               <a:rPr lang="en-US" dirty="0" smtClean="0"/>
-              <a:t>3. CÁC ĐẦU MỤC CÔNG VIỆC</a:t>
+              <a:t> </a:t>
+            </a:r>
+            <a:r>
+              <a:rPr lang="en-US" dirty="0" err="1" smtClean="0"/>
+              <a:t>định</a:t>
+            </a:r>
+            <a:r>
+              <a:rPr lang="en-US" dirty="0" smtClean="0"/>
+              <a:t> </a:t>
+            </a:r>
+            <a:r>
+              <a:rPr lang="en-US" dirty="0" err="1" smtClean="0"/>
+              <a:t>yêu</a:t>
+            </a:r>
+            <a:r>
+              <a:rPr lang="en-US" dirty="0" smtClean="0"/>
+              <a:t> </a:t>
+            </a:r>
+            <a:r>
+              <a:rPr lang="en-US" dirty="0" err="1" smtClean="0"/>
+              <a:t>cầu</a:t>
+            </a:r>
+            <a:r>
+              <a:rPr lang="en-US" dirty="0" smtClean="0"/>
+              <a:t> </a:t>
+            </a:r>
+            <a:r>
+              <a:rPr lang="en-US" dirty="0" err="1" smtClean="0"/>
+              <a:t>bài</a:t>
+            </a:r>
+            <a:r>
+              <a:rPr lang="en-US" dirty="0" smtClean="0"/>
+              <a:t> </a:t>
+            </a:r>
+            <a:r>
+              <a:rPr lang="en-US" dirty="0" err="1" smtClean="0"/>
+              <a:t>toán</a:t>
+            </a:r>
+            <a:endParaRPr lang="en-US" dirty="0"/>
+          </a:p>
+        </p:txBody>
+      </p:sp>
+      <p:sp>
+        <p:nvSpPr>
+          <p:cNvPr id="7" name="Oval 6"/>
+          <p:cNvSpPr/>
+          <p:nvPr/>
+        </p:nvSpPr>
+        <p:spPr>
+          <a:xfrm>
+            <a:off x="6276302" y="3281964"/>
+            <a:ext cx="4632101" cy="1159099"/>
+          </a:xfrm>
+          <a:prstGeom prst="ellipse">
+            <a:avLst/>
+          </a:prstGeom>
+        </p:spPr>
+        <p:style>
+          <a:lnRef idx="1">
+            <a:schemeClr val="accent3"/>
+          </a:lnRef>
+          <a:fillRef idx="2">
+            <a:schemeClr val="accent3"/>
+          </a:fillRef>
+          <a:effectRef idx="1">
+            <a:schemeClr val="accent3"/>
+          </a:effectRef>
+          <a:fontRef idx="minor">
+            <a:schemeClr val="dk1"/>
+          </a:fontRef>
+        </p:style>
+        <p:txBody>
+          <a:bodyPr rtlCol="0" anchor="ctr"/>
+          <a:lstStyle/>
+          <a:p>
+            <a:pPr algn="ctr"/>
+            <a:r>
+              <a:rPr lang="en-US" dirty="0" err="1" smtClean="0"/>
+              <a:t>Xác</a:t>
+            </a:r>
+            <a:r>
+              <a:rPr lang="en-US" dirty="0" smtClean="0"/>
+              <a:t> </a:t>
+            </a:r>
+            <a:r>
+              <a:rPr lang="en-US" dirty="0" err="1" smtClean="0"/>
+              <a:t>định</a:t>
+            </a:r>
+            <a:r>
+              <a:rPr lang="en-US" dirty="0" smtClean="0"/>
+              <a:t> </a:t>
+            </a:r>
+            <a:r>
+              <a:rPr lang="en-US" dirty="0" err="1" smtClean="0"/>
+              <a:t>những</a:t>
+            </a:r>
+            <a:r>
+              <a:rPr lang="en-US" dirty="0" smtClean="0"/>
+              <a:t> </a:t>
+            </a:r>
+            <a:r>
+              <a:rPr lang="en-US" dirty="0" err="1" smtClean="0"/>
+              <a:t>thành</a:t>
+            </a:r>
+            <a:r>
+              <a:rPr lang="en-US" dirty="0" smtClean="0"/>
+              <a:t> </a:t>
+            </a:r>
+            <a:r>
+              <a:rPr lang="en-US" dirty="0" err="1" smtClean="0"/>
+              <a:t>phần</a:t>
+            </a:r>
+            <a:r>
+              <a:rPr lang="en-US" dirty="0" smtClean="0"/>
+              <a:t> </a:t>
+            </a:r>
+            <a:r>
+              <a:rPr lang="en-US" dirty="0" err="1" smtClean="0"/>
+              <a:t>liên</a:t>
+            </a:r>
+            <a:r>
+              <a:rPr lang="en-US" dirty="0" smtClean="0"/>
+              <a:t> </a:t>
+            </a:r>
+            <a:r>
+              <a:rPr lang="en-US" dirty="0" err="1" smtClean="0"/>
+              <a:t>quan</a:t>
+            </a:r>
+            <a:endParaRPr lang="en-US" dirty="0"/>
+          </a:p>
+        </p:txBody>
+      </p:sp>
+      <p:sp>
+        <p:nvSpPr>
+          <p:cNvPr id="8" name="Oval 7"/>
+          <p:cNvSpPr/>
+          <p:nvPr/>
+        </p:nvSpPr>
+        <p:spPr>
+          <a:xfrm>
+            <a:off x="6276303" y="5020613"/>
+            <a:ext cx="4632101" cy="1159099"/>
+          </a:xfrm>
+          <a:prstGeom prst="ellipse">
+            <a:avLst/>
+          </a:prstGeom>
+        </p:spPr>
+        <p:style>
+          <a:lnRef idx="1">
+            <a:schemeClr val="accent3"/>
+          </a:lnRef>
+          <a:fillRef idx="2">
+            <a:schemeClr val="accent3"/>
+          </a:fillRef>
+          <a:effectRef idx="1">
+            <a:schemeClr val="accent3"/>
+          </a:effectRef>
+          <a:fontRef idx="minor">
+            <a:schemeClr val="dk1"/>
+          </a:fontRef>
+        </p:style>
+        <p:txBody>
+          <a:bodyPr rtlCol="0" anchor="ctr"/>
+          <a:lstStyle/>
+          <a:p>
+            <a:pPr algn="ctr"/>
+            <a:r>
+              <a:rPr lang="en-US" dirty="0" err="1"/>
+              <a:t>L</a:t>
+            </a:r>
+            <a:r>
+              <a:rPr lang="en-US" dirty="0" err="1" smtClean="0"/>
+              <a:t>ập</a:t>
+            </a:r>
+            <a:r>
+              <a:rPr lang="en-US" dirty="0" smtClean="0"/>
+              <a:t> Project </a:t>
+            </a:r>
+            <a:r>
+              <a:rPr lang="en-US" dirty="0"/>
+              <a:t>Charter </a:t>
             </a:r>
             <a:endParaRPr lang="en-US" dirty="0"/>
           </a:p>
@@ -5807,6 +6941,13 @@
       </p:transition>
     </mc:Fallback>
   </mc:AlternateContent>
+  <p:timing>
+    <p:tnLst>
+      <p:par>
+        <p:cTn id="1" dur="indefinite" restart="never" nodeType="tmRoot"/>
+      </p:par>
+    </p:tnLst>
+  </p:timing>
 </p:sld>
 </file>
 
@@ -5829,12 +6970,12 @@
       </p:grpSpPr>
       <p:sp>
         <p:nvSpPr>
-          <p:cNvPr id="2" name="Content Placeholder 1"/>
-          <p:cNvSpPr>
-            <a:spLocks noGrp="1"/>
-          </p:cNvSpPr>
-          <p:nvPr>
-            <p:ph idx="1"/>
+          <p:cNvPr id="3" name="Title 2"/>
+          <p:cNvSpPr>
+            <a:spLocks noGrp="1"/>
+          </p:cNvSpPr>
+          <p:nvPr>
+            <p:ph type="title"/>
           </p:nvPr>
         </p:nvSpPr>
         <p:spPr/>
@@ -5842,25 +6983,207 @@
           <a:bodyPr/>
           <a:lstStyle/>
           <a:p>
-            <a:endParaRPr lang="en-US"/>
-          </a:p>
-        </p:txBody>
-      </p:sp>
-      <p:sp>
-        <p:nvSpPr>
-          <p:cNvPr id="3" name="Title 2"/>
-          <p:cNvSpPr>
-            <a:spLocks noGrp="1"/>
-          </p:cNvSpPr>
-          <p:nvPr>
-            <p:ph type="title"/>
-          </p:nvPr>
-        </p:nvSpPr>
-        <p:spPr/>
-        <p:txBody>
-          <a:bodyPr/>
+            <a:r>
+              <a:rPr lang="en-US" dirty="0" smtClean="0"/>
+              <a:t>3. CÁC ĐẦU MỤC CÔNG VIỆC</a:t>
+            </a:r>
+            <a:endParaRPr lang="en-US" dirty="0"/>
+          </a:p>
+        </p:txBody>
+      </p:sp>
+      <p:sp>
+        <p:nvSpPr>
+          <p:cNvPr id="2" name="Rectangle 1"/>
+          <p:cNvSpPr/>
+          <p:nvPr/>
+        </p:nvSpPr>
+        <p:spPr>
+          <a:xfrm>
+            <a:off x="1300766" y="2266682"/>
+            <a:ext cx="1880315" cy="4037526"/>
+          </a:xfrm>
+          <a:prstGeom prst="rect">
+            <a:avLst/>
+          </a:prstGeom>
+        </p:spPr>
+        <p:style>
+          <a:lnRef idx="1">
+            <a:schemeClr val="accent3"/>
+          </a:lnRef>
+          <a:fillRef idx="2">
+            <a:schemeClr val="accent3"/>
+          </a:fillRef>
+          <a:effectRef idx="1">
+            <a:schemeClr val="accent3"/>
+          </a:effectRef>
+          <a:fontRef idx="minor">
+            <a:schemeClr val="dk1"/>
+          </a:fontRef>
+        </p:style>
+        <p:txBody>
+          <a:bodyPr rtlCol="0" anchor="ctr"/>
           <a:lstStyle/>
           <a:p>
+            <a:pPr algn="ctr"/>
+            <a:r>
+              <a:rPr lang="en-US" dirty="0" smtClean="0"/>
+              <a:t>Planning</a:t>
+            </a:r>
+          </a:p>
+        </p:txBody>
+      </p:sp>
+      <p:sp>
+        <p:nvSpPr>
+          <p:cNvPr id="4" name="Oval 3"/>
+          <p:cNvSpPr/>
+          <p:nvPr/>
+        </p:nvSpPr>
+        <p:spPr>
+          <a:xfrm>
+            <a:off x="5473521" y="2021983"/>
+            <a:ext cx="5190186" cy="1133341"/>
+          </a:xfrm>
+          <a:prstGeom prst="ellipse">
+            <a:avLst/>
+          </a:prstGeom>
+        </p:spPr>
+        <p:style>
+          <a:lnRef idx="1">
+            <a:schemeClr val="accent3"/>
+          </a:lnRef>
+          <a:fillRef idx="2">
+            <a:schemeClr val="accent3"/>
+          </a:fillRef>
+          <a:effectRef idx="1">
+            <a:schemeClr val="accent3"/>
+          </a:effectRef>
+          <a:fontRef idx="minor">
+            <a:schemeClr val="dk1"/>
+          </a:fontRef>
+        </p:style>
+        <p:txBody>
+          <a:bodyPr rtlCol="0" anchor="ctr"/>
+          <a:lstStyle/>
+          <a:p>
+            <a:pPr algn="ctr"/>
+            <a:r>
+              <a:rPr lang="en-US" dirty="0" err="1" smtClean="0"/>
+              <a:t>Lập</a:t>
+            </a:r>
+            <a:r>
+              <a:rPr lang="en-US" dirty="0" smtClean="0"/>
+              <a:t> project team</a:t>
+            </a:r>
+          </a:p>
+        </p:txBody>
+      </p:sp>
+      <p:sp>
+        <p:nvSpPr>
+          <p:cNvPr id="5" name="Oval 4"/>
+          <p:cNvSpPr/>
+          <p:nvPr/>
+        </p:nvSpPr>
+        <p:spPr>
+          <a:xfrm>
+            <a:off x="5473521" y="3616817"/>
+            <a:ext cx="5190186" cy="1133341"/>
+          </a:xfrm>
+          <a:prstGeom prst="ellipse">
+            <a:avLst/>
+          </a:prstGeom>
+        </p:spPr>
+        <p:style>
+          <a:lnRef idx="1">
+            <a:schemeClr val="accent3"/>
+          </a:lnRef>
+          <a:fillRef idx="2">
+            <a:schemeClr val="accent3"/>
+          </a:fillRef>
+          <a:effectRef idx="1">
+            <a:schemeClr val="accent3"/>
+          </a:effectRef>
+          <a:fontRef idx="minor">
+            <a:schemeClr val="dk1"/>
+          </a:fontRef>
+        </p:style>
+        <p:txBody>
+          <a:bodyPr rtlCol="0" anchor="ctr"/>
+          <a:lstStyle/>
+          <a:p>
+            <a:pPr algn="ctr"/>
+            <a:r>
+              <a:rPr lang="en-US" dirty="0" err="1" smtClean="0"/>
+              <a:t>Lập</a:t>
+            </a:r>
+            <a:r>
+              <a:rPr lang="en-US" dirty="0" smtClean="0"/>
+              <a:t> project plan</a:t>
+            </a:r>
+          </a:p>
+        </p:txBody>
+      </p:sp>
+      <p:sp>
+        <p:nvSpPr>
+          <p:cNvPr id="6" name="Oval 5"/>
+          <p:cNvSpPr/>
+          <p:nvPr/>
+        </p:nvSpPr>
+        <p:spPr>
+          <a:xfrm>
+            <a:off x="5686022" y="5211651"/>
+            <a:ext cx="4765183" cy="1120462"/>
+          </a:xfrm>
+          <a:prstGeom prst="ellipse">
+            <a:avLst/>
+          </a:prstGeom>
+        </p:spPr>
+        <p:style>
+          <a:lnRef idx="1">
+            <a:schemeClr val="accent3"/>
+          </a:lnRef>
+          <a:fillRef idx="2">
+            <a:schemeClr val="accent3"/>
+          </a:fillRef>
+          <a:effectRef idx="1">
+            <a:schemeClr val="accent3"/>
+          </a:effectRef>
+          <a:fontRef idx="minor">
+            <a:schemeClr val="dk1"/>
+          </a:fontRef>
+        </p:style>
+        <p:txBody>
+          <a:bodyPr rtlCol="0" anchor="ctr"/>
+          <a:lstStyle/>
+          <a:p>
+            <a:pPr algn="ctr"/>
+            <a:r>
+              <a:rPr lang="en-US" dirty="0" err="1" smtClean="0"/>
+              <a:t>Xác</a:t>
+            </a:r>
+            <a:r>
+              <a:rPr lang="en-US" dirty="0" smtClean="0"/>
+              <a:t> </a:t>
+            </a:r>
+            <a:r>
+              <a:rPr lang="en-US" dirty="0" err="1" smtClean="0"/>
+              <a:t>định</a:t>
+            </a:r>
+            <a:r>
+              <a:rPr lang="en-US" dirty="0" smtClean="0"/>
+              <a:t> </a:t>
+            </a:r>
+            <a:r>
+              <a:rPr lang="en-US" dirty="0" err="1" smtClean="0"/>
+              <a:t>các</a:t>
+            </a:r>
+            <a:r>
+              <a:rPr lang="en-US" dirty="0" smtClean="0"/>
+              <a:t> </a:t>
+            </a:r>
+            <a:r>
+              <a:rPr lang="en-US" i="1" dirty="0"/>
+              <a:t>Milestone</a:t>
+            </a:r>
             <a:endParaRPr lang="en-US" dirty="0"/>
           </a:p>
         </p:txBody>
@@ -5868,7 +7191,7 @@
     </p:spTree>
     <p:extLst>
       <p:ext uri="{BB962C8B-B14F-4D97-AF65-F5344CB8AC3E}">
-        <p14:creationId xmlns:p14="http://schemas.microsoft.com/office/powerpoint/2010/main" val="1365680749"/>
+        <p14:creationId xmlns:p14="http://schemas.microsoft.com/office/powerpoint/2010/main" val="1370049861"/>
       </p:ext>
     </p:extLst>
   </p:cSld>
@@ -5887,6 +7210,13 @@
       </p:transition>
     </mc:Fallback>
   </mc:AlternateContent>
+  <p:timing>
+    <p:tnLst>
+      <p:par>
+        <p:cTn id="1" dur="indefinite" restart="never" nodeType="tmRoot"/>
+      </p:par>
+    </p:tnLst>
+  </p:timing>
 </p:sld>
 </file>
 

</xml_diff>